<commit_message>
updated to lecture 2 slides
</commit_message>
<xml_diff>
--- a/slides/lecture_2.pptx
+++ b/slides/lecture_2.pptx
@@ -5,7 +5,7 @@
     <p:sldMasterId id="2147483648" r:id="rId1"/>
   </p:sldMasterIdLst>
   <p:notesMasterIdLst>
-    <p:notesMasterId r:id="rId28"/>
+    <p:notesMasterId r:id="rId29"/>
   </p:notesMasterIdLst>
   <p:sldIdLst>
     <p:sldId id="256" r:id="rId2"/>
@@ -33,7 +33,8 @@
     <p:sldId id="296" r:id="rId24"/>
     <p:sldId id="294" r:id="rId25"/>
     <p:sldId id="297" r:id="rId26"/>
-    <p:sldId id="274" r:id="rId27"/>
+    <p:sldId id="298" r:id="rId27"/>
+    <p:sldId id="274" r:id="rId28"/>
   </p:sldIdLst>
   <p:sldSz cx="9144000" cy="6858000" type="screen4x3"/>
   <p:notesSz cx="6858000" cy="9144000"/>
@@ -217,7 +218,7 @@
           <a:p>
             <a:fld id="{0A92C876-EF44-8A4B-8C53-99726796C231}" type="datetimeFigureOut">
               <a:rPr lang="en-US" smtClean="0"/>
-              <a:t>2/19/15</a:t>
+              <a:t>2/20/15</a:t>
             </a:fld>
             <a:endParaRPr lang="en-US"/>
           </a:p>
@@ -1029,7 +1030,7 @@
           <a:p>
             <a:fld id="{6BFECD78-3C8E-49F2-8FAB-59489D168ABB}" type="datetimeFigureOut">
               <a:rPr lang="en-US" smtClean="0"/>
-              <a:t>2/19/15</a:t>
+              <a:t>2/20/15</a:t>
             </a:fld>
             <a:endParaRPr lang="en-US"/>
           </a:p>
@@ -1199,7 +1200,7 @@
           <a:p>
             <a:fld id="{6BFECD78-3C8E-49F2-8FAB-59489D168ABB}" type="datetimeFigureOut">
               <a:rPr lang="en-US" smtClean="0"/>
-              <a:t>2/19/15</a:t>
+              <a:t>2/20/15</a:t>
             </a:fld>
             <a:endParaRPr lang="en-US"/>
           </a:p>
@@ -1379,7 +1380,7 @@
           <a:p>
             <a:fld id="{6BFECD78-3C8E-49F2-8FAB-59489D168ABB}" type="datetimeFigureOut">
               <a:rPr lang="en-US" smtClean="0"/>
-              <a:t>2/19/15</a:t>
+              <a:t>2/20/15</a:t>
             </a:fld>
             <a:endParaRPr lang="en-US"/>
           </a:p>
@@ -1549,7 +1550,7 @@
           <a:p>
             <a:fld id="{6BFECD78-3C8E-49F2-8FAB-59489D168ABB}" type="datetimeFigureOut">
               <a:rPr lang="en-US" smtClean="0"/>
-              <a:t>2/19/15</a:t>
+              <a:t>2/20/15</a:t>
             </a:fld>
             <a:endParaRPr lang="en-US"/>
           </a:p>
@@ -1795,7 +1796,7 @@
           <a:p>
             <a:fld id="{6BFECD78-3C8E-49F2-8FAB-59489D168ABB}" type="datetimeFigureOut">
               <a:rPr lang="en-US" smtClean="0"/>
-              <a:t>2/19/15</a:t>
+              <a:t>2/20/15</a:t>
             </a:fld>
             <a:endParaRPr lang="en-US"/>
           </a:p>
@@ -2083,7 +2084,7 @@
           <a:p>
             <a:fld id="{6BFECD78-3C8E-49F2-8FAB-59489D168ABB}" type="datetimeFigureOut">
               <a:rPr lang="en-US" smtClean="0"/>
-              <a:t>2/19/15</a:t>
+              <a:t>2/20/15</a:t>
             </a:fld>
             <a:endParaRPr lang="en-US"/>
           </a:p>
@@ -2505,7 +2506,7 @@
           <a:p>
             <a:fld id="{6BFECD78-3C8E-49F2-8FAB-59489D168ABB}" type="datetimeFigureOut">
               <a:rPr lang="en-US" smtClean="0"/>
-              <a:t>2/19/15</a:t>
+              <a:t>2/20/15</a:t>
             </a:fld>
             <a:endParaRPr lang="en-US"/>
           </a:p>
@@ -2623,7 +2624,7 @@
           <a:p>
             <a:fld id="{6BFECD78-3C8E-49F2-8FAB-59489D168ABB}" type="datetimeFigureOut">
               <a:rPr lang="en-US" smtClean="0"/>
-              <a:t>2/19/15</a:t>
+              <a:t>2/20/15</a:t>
             </a:fld>
             <a:endParaRPr lang="en-US"/>
           </a:p>
@@ -2718,7 +2719,7 @@
           <a:p>
             <a:fld id="{6BFECD78-3C8E-49F2-8FAB-59489D168ABB}" type="datetimeFigureOut">
               <a:rPr lang="en-US" smtClean="0"/>
-              <a:t>2/19/15</a:t>
+              <a:t>2/20/15</a:t>
             </a:fld>
             <a:endParaRPr lang="en-US"/>
           </a:p>
@@ -2995,7 +2996,7 @@
           <a:p>
             <a:fld id="{6BFECD78-3C8E-49F2-8FAB-59489D168ABB}" type="datetimeFigureOut">
               <a:rPr lang="en-US" smtClean="0"/>
-              <a:t>2/19/15</a:t>
+              <a:t>2/20/15</a:t>
             </a:fld>
             <a:endParaRPr lang="en-US"/>
           </a:p>
@@ -3252,7 +3253,7 @@
           <a:p>
             <a:fld id="{6BFECD78-3C8E-49F2-8FAB-59489D168ABB}" type="datetimeFigureOut">
               <a:rPr lang="en-US" smtClean="0"/>
-              <a:t>2/19/15</a:t>
+              <a:t>2/20/15</a:t>
             </a:fld>
             <a:endParaRPr lang="en-US"/>
           </a:p>
@@ -3465,7 +3466,7 @@
           <a:p>
             <a:fld id="{6BFECD78-3C8E-49F2-8FAB-59489D168ABB}" type="datetimeFigureOut">
               <a:rPr lang="en-US" smtClean="0"/>
-              <a:t>2/19/15</a:t>
+              <a:t>2/20/15</a:t>
             </a:fld>
             <a:endParaRPr lang="en-US"/>
           </a:p>
@@ -3880,7 +3881,6 @@
               <a:rPr lang="en-US" dirty="0" smtClean="0"/>
               <a:t>2</a:t>
             </a:r>
-            <a:endParaRPr lang="en-US" dirty="0" smtClean="0"/>
           </a:p>
           <a:p>
             <a:endParaRPr lang="en-US" dirty="0" smtClean="0"/>
@@ -3929,19 +3929,7 @@
             </a:pPr>
             <a:r>
               <a:rPr lang="en-US" sz="2800" dirty="0" smtClean="0"/>
-              <a:t>February </a:t>
-            </a:r>
-            <a:r>
-              <a:rPr lang="en-US" sz="2800" dirty="0" smtClean="0"/>
-              <a:t>20</a:t>
-            </a:r>
-            <a:r>
-              <a:rPr lang="en-US" sz="2800" dirty="0" smtClean="0"/>
-              <a:t>, </a:t>
-            </a:r>
-            <a:r>
-              <a:rPr lang="en-US" sz="2800" dirty="0" smtClean="0"/>
-              <a:t>2015</a:t>
+              <a:t>February 20, 2015</a:t>
             </a:r>
             <a:endParaRPr lang="en-US" sz="2800" dirty="0"/>
           </a:p>
@@ -5365,11 +5353,6 @@
               </a:rPr>
               <a:t>wisdom of crowds experiment</a:t>
             </a:r>
-            <a:endParaRPr lang="en-US" sz="3600" dirty="0" smtClean="0">
-              <a:solidFill>
-                <a:srgbClr val="FFFF00"/>
-              </a:solidFill>
-            </a:endParaRPr>
           </a:p>
         </p:txBody>
       </p:sp>
@@ -5569,7 +5552,7 @@
         <p:spPr>
           <a:xfrm>
             <a:off x="1386228" y="1043732"/>
-            <a:ext cx="6371581" cy="3046988"/>
+            <a:ext cx="6371581" cy="4339650"/>
           </a:xfrm>
           <a:prstGeom prst="rect">
             <a:avLst/>
@@ -5591,11 +5574,6 @@
               </a:rPr>
               <a:t>The aggregation method matters</a:t>
             </a:r>
-            <a:endParaRPr lang="en-US" sz="3600" dirty="0" smtClean="0">
-              <a:solidFill>
-                <a:srgbClr val="FFFF00"/>
-              </a:solidFill>
-            </a:endParaRPr>
           </a:p>
           <a:p>
             <a:pPr algn="ctr"/>
@@ -5603,7 +5581,6 @@
               <a:rPr lang="en-US" sz="2800" dirty="0" smtClean="0"/>
               <a:t>need to account for extreme values</a:t>
             </a:r>
-            <a:endParaRPr lang="en-US" sz="2800" dirty="0" smtClean="0"/>
           </a:p>
           <a:p>
             <a:pPr algn="ctr"/>
@@ -5652,6 +5629,53 @@
                 </a:solidFill>
               </a:rPr>
               <a:t>]</a:t>
+            </a:r>
+          </a:p>
+          <a:p>
+            <a:pPr algn="ctr"/>
+            <a:endParaRPr lang="en-US" sz="2800" dirty="0">
+              <a:solidFill>
+                <a:schemeClr val="tx1">
+                  <a:lumMod val="50000"/>
+                </a:schemeClr>
+              </a:solidFill>
+            </a:endParaRPr>
+          </a:p>
+          <a:p>
+            <a:pPr algn="ctr"/>
+            <a:endParaRPr lang="en-US" sz="2800" dirty="0">
+              <a:solidFill>
+                <a:schemeClr val="tx1">
+                  <a:lumMod val="50000"/>
+                </a:schemeClr>
+              </a:solidFill>
+            </a:endParaRPr>
+          </a:p>
+          <a:p>
+            <a:pPr algn="ctr"/>
+            <a:r>
+              <a:rPr lang="en-US" sz="2800" dirty="0" smtClean="0"/>
+              <a:t>[ doc</a:t>
+            </a:r>
+            <a:r>
+              <a:rPr lang="en-US" sz="2800" dirty="0"/>
+              <a:t>/</a:t>
+            </a:r>
+            <a:r>
+              <a:rPr lang="en-US" sz="2800" dirty="0" err="1"/>
+              <a:t>inClass_exp</a:t>
+            </a:r>
+            <a:r>
+              <a:rPr lang="en-US" sz="2800" dirty="0"/>
+              <a:t>/</a:t>
+            </a:r>
+            <a:r>
+              <a:rPr lang="en-US" sz="2800" dirty="0" err="1" smtClean="0"/>
+              <a:t>survey_results.pdf</a:t>
+            </a:r>
+            <a:r>
+              <a:rPr lang="en-US" sz="2800" dirty="0" smtClean="0"/>
+              <a:t> ]</a:t>
             </a:r>
             <a:endParaRPr lang="en-US" sz="2800" dirty="0">
               <a:solidFill>
@@ -5772,11 +5796,6 @@
               </a:rPr>
               <a:t>design winners are…</a:t>
             </a:r>
-            <a:endParaRPr lang="en-US" sz="3600" dirty="0" smtClean="0">
-              <a:solidFill>
-                <a:srgbClr val="FFFF00"/>
-              </a:solidFill>
-            </a:endParaRPr>
           </a:p>
         </p:txBody>
       </p:sp>
@@ -5884,7 +5903,15 @@
                   <a:srgbClr val="FFFF00"/>
                 </a:solidFill>
               </a:rPr>
-              <a:t>traceback</a:t>
+              <a:t>T</a:t>
+            </a:r>
+            <a:r>
+              <a:rPr lang="en-US" sz="3600" dirty="0" err="1" smtClean="0">
+                <a:solidFill>
+                  <a:srgbClr val="FFFF00"/>
+                </a:solidFill>
+              </a:rPr>
+              <a:t>raceback</a:t>
             </a:r>
             <a:endParaRPr lang="en-US" sz="3600" dirty="0">
               <a:solidFill>
@@ -6466,6 +6493,148 @@
         </p:nvSpPr>
         <p:spPr>
           <a:xfrm>
+            <a:off x="1323246" y="1619250"/>
+            <a:ext cx="6301174" cy="2800767"/>
+          </a:xfrm>
+          <a:prstGeom prst="rect">
+            <a:avLst/>
+          </a:prstGeom>
+          <a:noFill/>
+        </p:spPr>
+        <p:txBody>
+          <a:bodyPr wrap="none" rtlCol="0">
+            <a:spAutoFit/>
+          </a:bodyPr>
+          <a:lstStyle/>
+          <a:p>
+            <a:pPr algn="ctr"/>
+            <a:r>
+              <a:rPr lang="en-US" sz="3600" dirty="0" err="1">
+                <a:solidFill>
+                  <a:srgbClr val="FFFF00"/>
+                </a:solidFill>
+              </a:rPr>
+              <a:t>GitHub</a:t>
+            </a:r>
+            <a:endParaRPr lang="en-US" sz="3600" dirty="0">
+              <a:solidFill>
+                <a:srgbClr val="FFFF00"/>
+              </a:solidFill>
+            </a:endParaRPr>
+          </a:p>
+          <a:p>
+            <a:pPr algn="ctr"/>
+            <a:r>
+              <a:rPr lang="en-US" sz="2800" dirty="0">
+                <a:solidFill>
+                  <a:srgbClr val="FFFFFF"/>
+                </a:solidFill>
+              </a:rPr>
+              <a:t>submit usernames </a:t>
+            </a:r>
+            <a:r>
+              <a:rPr lang="en-US" sz="2800" dirty="0"/>
+              <a:t>by</a:t>
+            </a:r>
+            <a:r>
+              <a:rPr lang="en-US" sz="2800" dirty="0">
+                <a:solidFill>
+                  <a:srgbClr val="FFFF00"/>
+                </a:solidFill>
+              </a:rPr>
+              <a:t> noon PST </a:t>
+            </a:r>
+            <a:r>
+              <a:rPr lang="en-US" sz="2800" dirty="0" smtClean="0">
+                <a:solidFill>
+                  <a:srgbClr val="FFFF00"/>
+                </a:solidFill>
+              </a:rPr>
+              <a:t>today</a:t>
+            </a:r>
+          </a:p>
+          <a:p>
+            <a:pPr algn="ctr"/>
+            <a:r>
+              <a:rPr lang="en-US" sz="2800" dirty="0" smtClean="0">
+                <a:solidFill>
+                  <a:srgbClr val="FFFFFF"/>
+                </a:solidFill>
+              </a:rPr>
+              <a:t>[ for pushing changes / tracking progress ]</a:t>
+            </a:r>
+          </a:p>
+          <a:p>
+            <a:pPr algn="ctr"/>
+            <a:endParaRPr lang="en-US" sz="2800" dirty="0">
+              <a:solidFill>
+                <a:srgbClr val="FFFFFF"/>
+              </a:solidFill>
+            </a:endParaRPr>
+          </a:p>
+          <a:p>
+            <a:pPr algn="ctr"/>
+            <a:r>
+              <a:rPr lang="en-US" sz="2800" dirty="0" smtClean="0">
+                <a:solidFill>
+                  <a:srgbClr val="FFFFFF"/>
+                </a:solidFill>
+              </a:rPr>
+              <a:t>do not create extraneous branches;</a:t>
+            </a:r>
+          </a:p>
+          <a:p>
+            <a:pPr algn="ctr"/>
+            <a:r>
+              <a:rPr lang="en-US" sz="2800" dirty="0" smtClean="0">
+                <a:solidFill>
+                  <a:srgbClr val="FFFFFF"/>
+                </a:solidFill>
+              </a:rPr>
+              <a:t>push directly to the repository</a:t>
+            </a:r>
+            <a:endParaRPr lang="en-US" sz="2800" dirty="0"/>
+          </a:p>
+        </p:txBody>
+      </p:sp>
+    </p:spTree>
+    <p:extLst>
+      <p:ext uri="{BB962C8B-B14F-4D97-AF65-F5344CB8AC3E}">
+        <p14:creationId xmlns:p14="http://schemas.microsoft.com/office/powerpoint/2010/main" val="3494649003"/>
+      </p:ext>
+    </p:extLst>
+  </p:cSld>
+  <p:clrMapOvr>
+    <a:masterClrMapping/>
+  </p:clrMapOvr>
+</p:sld>
+</file>
+
+<file path=ppt/slides/slide27.xml><?xml version="1.0" encoding="utf-8"?>
+<p:sld xmlns:a="http://schemas.openxmlformats.org/drawingml/2006/main" xmlns:r="http://schemas.openxmlformats.org/officeDocument/2006/relationships" xmlns:p="http://schemas.openxmlformats.org/presentationml/2006/main">
+  <p:cSld>
+    <p:spTree>
+      <p:nvGrpSpPr>
+        <p:cNvPr id="1" name=""/>
+        <p:cNvGrpSpPr/>
+        <p:nvPr/>
+      </p:nvGrpSpPr>
+      <p:grpSpPr>
+        <a:xfrm>
+          <a:off x="0" y="0"/>
+          <a:ext cx="0" cy="0"/>
+          <a:chOff x="0" y="0"/>
+          <a:chExt cx="0" cy="0"/>
+        </a:xfrm>
+      </p:grpSpPr>
+      <p:sp>
+        <p:nvSpPr>
+          <p:cNvPr id="2" name="TextBox 1"/>
+          <p:cNvSpPr txBox="1"/>
+          <p:nvPr/>
+        </p:nvSpPr>
+        <p:spPr>
+          <a:xfrm>
             <a:off x="4079875" y="1476375"/>
             <a:ext cx="184666" cy="369332"/>
           </a:xfrm>
@@ -6496,7 +6665,7 @@
         </p:nvSpPr>
         <p:spPr>
           <a:xfrm>
-            <a:off x="2129884" y="1043732"/>
+            <a:off x="2129887" y="1043732"/>
             <a:ext cx="4884270" cy="4462760"/>
           </a:xfrm>
           <a:prstGeom prst="rect">
@@ -6519,30 +6688,22 @@
               </a:rPr>
               <a:t>Assignment</a:t>
             </a:r>
-          </a:p>
-          <a:p>
-            <a:pPr algn="ctr"/>
-            <a:r>
-              <a:rPr lang="en-US" sz="3600" dirty="0" smtClean="0">
-                <a:solidFill>
-                  <a:srgbClr val="FFFF00"/>
-                </a:solidFill>
-              </a:rPr>
-              <a:t>[ </a:t>
-            </a:r>
-            <a:r>
-              <a:rPr lang="en-US" sz="3600" dirty="0" smtClean="0">
-                <a:solidFill>
-                  <a:srgbClr val="FFFF00"/>
-                </a:solidFill>
-              </a:rPr>
-              <a:t>all teams ]</a:t>
-            </a:r>
             <a:endParaRPr lang="en-US" sz="3600" dirty="0" smtClean="0">
               <a:solidFill>
                 <a:srgbClr val="FFFF00"/>
               </a:solidFill>
             </a:endParaRPr>
+          </a:p>
+          <a:p>
+            <a:pPr algn="ctr"/>
+            <a:r>
+              <a:rPr lang="en-US" sz="3600" dirty="0" smtClean="0">
+                <a:solidFill>
+                  <a:srgbClr val="FFFF00"/>
+                </a:solidFill>
+              </a:rPr>
+              <a:t>[ all teams ]</a:t>
+            </a:r>
           </a:p>
           <a:p>
             <a:pPr algn="ctr"/>
@@ -7275,11 +7436,7 @@
             <a:pPr algn="ctr"/>
             <a:r>
               <a:rPr lang="en-US" sz="2800" dirty="0" smtClean="0"/>
-              <a:t>First re</a:t>
-            </a:r>
-            <a:r>
-              <a:rPr lang="en-US" sz="2800" dirty="0" smtClean="0"/>
-              <a:t>move largest and smallest 5% of values, </a:t>
+              <a:t>First remove largest and smallest 5% of values, </a:t>
             </a:r>
           </a:p>
           <a:p>
@@ -7288,7 +7445,6 @@
               <a:rPr lang="en-US" sz="2800" dirty="0" smtClean="0"/>
               <a:t>and then take the mean of the remaining values</a:t>
             </a:r>
-            <a:endParaRPr lang="en-US" sz="2800" dirty="0" smtClean="0"/>
           </a:p>
         </p:txBody>
       </p:sp>

</xml_diff>